<commit_message>
Added Fritz to presentation
</commit_message>
<xml_diff>
--- a/presentation/IOT- SEIS785.pptx
+++ b/presentation/IOT- SEIS785.pptx
@@ -9,9 +9,10 @@
     <p:sldId id="257" r:id="rId3"/>
     <p:sldId id="258" r:id="rId4"/>
     <p:sldId id="260" r:id="rId5"/>
-    <p:sldId id="261" r:id="rId6"/>
-    <p:sldId id="262" r:id="rId7"/>
-    <p:sldId id="259" r:id="rId8"/>
+    <p:sldId id="263" r:id="rId6"/>
+    <p:sldId id="261" r:id="rId7"/>
+    <p:sldId id="262" r:id="rId8"/>
+    <p:sldId id="259" r:id="rId9"/>
   </p:sldIdLst>
   <p:sldSz cx="12192000" cy="6858000"/>
   <p:notesSz cx="6858000" cy="9144000"/>
@@ -348,7 +349,7 @@
             <a:fld id="{B61BEF0D-F0BB-DE4B-95CE-6DB70DBA9567}" type="datetimeFigureOut">
               <a:rPr lang="en-US" dirty="0"/>
               <a:pPr/>
-              <a:t>4/26/2016</a:t>
+              <a:t>4/27/2016</a:t>
             </a:fld>
             <a:endParaRPr lang="en-US" dirty="0"/>
           </a:p>
@@ -679,7 +680,7 @@
             <a:fld id="{B61BEF0D-F0BB-DE4B-95CE-6DB70DBA9567}" type="datetimeFigureOut">
               <a:rPr lang="en-US" dirty="0"/>
               <a:pPr/>
-              <a:t>4/26/2016</a:t>
+              <a:t>4/27/2016</a:t>
             </a:fld>
             <a:endParaRPr lang="en-US" dirty="0"/>
           </a:p>
@@ -954,7 +955,7 @@
             <a:fld id="{B61BEF0D-F0BB-DE4B-95CE-6DB70DBA9567}" type="datetimeFigureOut">
               <a:rPr lang="en-US" dirty="0"/>
               <a:pPr/>
-              <a:t>4/26/2016</a:t>
+              <a:t>4/27/2016</a:t>
             </a:fld>
             <a:endParaRPr lang="en-US" dirty="0"/>
           </a:p>
@@ -1519,7 +1520,7 @@
             <a:fld id="{B61BEF0D-F0BB-DE4B-95CE-6DB70DBA9567}" type="datetimeFigureOut">
               <a:rPr lang="en-US" dirty="0"/>
               <a:pPr/>
-              <a:t>4/26/2016</a:t>
+              <a:t>4/27/2016</a:t>
             </a:fld>
             <a:endParaRPr lang="en-US" dirty="0"/>
           </a:p>
@@ -1794,7 +1795,7 @@
             <a:fld id="{B61BEF0D-F0BB-DE4B-95CE-6DB70DBA9567}" type="datetimeFigureOut">
               <a:rPr lang="en-US" dirty="0"/>
               <a:pPr/>
-              <a:t>4/26/2016</a:t>
+              <a:t>4/27/2016</a:t>
             </a:fld>
             <a:endParaRPr lang="en-US" dirty="0"/>
           </a:p>
@@ -2353,7 +2354,7 @@
             <a:fld id="{B61BEF0D-F0BB-DE4B-95CE-6DB70DBA9567}" type="datetimeFigureOut">
               <a:rPr lang="en-US" dirty="0"/>
               <a:pPr/>
-              <a:t>4/26/2016</a:t>
+              <a:t>4/27/2016</a:t>
             </a:fld>
             <a:endParaRPr lang="en-US" dirty="0"/>
           </a:p>
@@ -2677,7 +2678,7 @@
             <a:fld id="{B61BEF0D-F0BB-DE4B-95CE-6DB70DBA9567}" type="datetimeFigureOut">
               <a:rPr lang="en-US" dirty="0"/>
               <a:pPr/>
-              <a:t>4/26/2016</a:t>
+              <a:t>4/27/2016</a:t>
             </a:fld>
             <a:endParaRPr lang="en-US" dirty="0"/>
           </a:p>
@@ -2879,7 +2880,7 @@
             <a:fld id="{B61BEF0D-F0BB-DE4B-95CE-6DB70DBA9567}" type="datetimeFigureOut">
               <a:rPr lang="en-US" dirty="0"/>
               <a:pPr/>
-              <a:t>4/26/2016</a:t>
+              <a:t>4/27/2016</a:t>
             </a:fld>
             <a:endParaRPr lang="en-US" dirty="0"/>
           </a:p>
@@ -3086,7 +3087,7 @@
             <a:fld id="{B61BEF0D-F0BB-DE4B-95CE-6DB70DBA9567}" type="datetimeFigureOut">
               <a:rPr lang="en-US" dirty="0"/>
               <a:pPr/>
-              <a:t>4/26/2016</a:t>
+              <a:t>4/27/2016</a:t>
             </a:fld>
             <a:endParaRPr lang="en-US" dirty="0"/>
           </a:p>
@@ -3283,7 +3284,7 @@
             <a:fld id="{B61BEF0D-F0BB-DE4B-95CE-6DB70DBA9567}" type="datetimeFigureOut">
               <a:rPr lang="en-US" dirty="0"/>
               <a:pPr/>
-              <a:t>4/26/2016</a:t>
+              <a:t>4/27/2016</a:t>
             </a:fld>
             <a:endParaRPr lang="en-US" dirty="0"/>
           </a:p>
@@ -3556,7 +3557,7 @@
             <a:fld id="{B61BEF0D-F0BB-DE4B-95CE-6DB70DBA9567}" type="datetimeFigureOut">
               <a:rPr lang="en-US" dirty="0"/>
               <a:pPr/>
-              <a:t>4/26/2016</a:t>
+              <a:t>4/27/2016</a:t>
             </a:fld>
             <a:endParaRPr lang="en-US" dirty="0"/>
           </a:p>
@@ -3819,7 +3820,7 @@
             <a:fld id="{B61BEF0D-F0BB-DE4B-95CE-6DB70DBA9567}" type="datetimeFigureOut">
               <a:rPr lang="en-US" dirty="0"/>
               <a:pPr/>
-              <a:t>4/26/2016</a:t>
+              <a:t>4/27/2016</a:t>
             </a:fld>
             <a:endParaRPr lang="en-US" dirty="0"/>
           </a:p>
@@ -4190,7 +4191,7 @@
             <a:fld id="{B61BEF0D-F0BB-DE4B-95CE-6DB70DBA9567}" type="datetimeFigureOut">
               <a:rPr lang="en-US" dirty="0"/>
               <a:pPr/>
-              <a:t>4/26/2016</a:t>
+              <a:t>4/27/2016</a:t>
             </a:fld>
             <a:endParaRPr lang="en-US" dirty="0"/>
           </a:p>
@@ -4335,7 +4336,7 @@
             <a:fld id="{B61BEF0D-F0BB-DE4B-95CE-6DB70DBA9567}" type="datetimeFigureOut">
               <a:rPr lang="en-US" dirty="0"/>
               <a:pPr/>
-              <a:t>4/26/2016</a:t>
+              <a:t>4/27/2016</a:t>
             </a:fld>
             <a:endParaRPr lang="en-US" dirty="0"/>
           </a:p>
@@ -4457,7 +4458,7 @@
             <a:fld id="{B61BEF0D-F0BB-DE4B-95CE-6DB70DBA9567}" type="datetimeFigureOut">
               <a:rPr lang="en-US" dirty="0"/>
               <a:pPr/>
-              <a:t>4/26/2016</a:t>
+              <a:t>4/27/2016</a:t>
             </a:fld>
             <a:endParaRPr lang="en-US" dirty="0"/>
           </a:p>
@@ -4739,7 +4740,7 @@
             <a:fld id="{B61BEF0D-F0BB-DE4B-95CE-6DB70DBA9567}" type="datetimeFigureOut">
               <a:rPr lang="en-US" dirty="0"/>
               <a:pPr/>
-              <a:t>4/26/2016</a:t>
+              <a:t>4/27/2016</a:t>
             </a:fld>
             <a:endParaRPr lang="en-US" dirty="0"/>
           </a:p>
@@ -5060,7 +5061,7 @@
             <a:fld id="{B61BEF0D-F0BB-DE4B-95CE-6DB70DBA9567}" type="datetimeFigureOut">
               <a:rPr lang="en-US" dirty="0"/>
               <a:pPr/>
-              <a:t>4/26/2016</a:t>
+              <a:t>4/27/2016</a:t>
             </a:fld>
             <a:endParaRPr lang="en-US" dirty="0"/>
           </a:p>
@@ -5271,7 +5272,7 @@
             <a:fld id="{B61BEF0D-F0BB-DE4B-95CE-6DB70DBA9567}" type="datetimeFigureOut">
               <a:rPr lang="en-US" dirty="0"/>
               <a:pPr/>
-              <a:t>4/26/2016</a:t>
+              <a:t>4/27/2016</a:t>
             </a:fld>
             <a:endParaRPr lang="en-US" dirty="0"/>
           </a:p>
@@ -6274,92 +6275,45 @@
           <a:p>
             <a:r>
               <a:rPr lang="en-US" dirty="0" smtClean="0"/>
-              <a:t>Technical Difficulties</a:t>
-            </a:r>
-            <a:endParaRPr lang="en-US" dirty="0"/>
-          </a:p>
-        </p:txBody>
-      </p:sp>
-      <p:sp>
-        <p:nvSpPr>
-          <p:cNvPr id="3" name="Content Placeholder 2"/>
-          <p:cNvSpPr>
-            <a:spLocks noGrp="1"/>
-          </p:cNvSpPr>
+              <a:t>Fritz Image for Project</a:t>
+            </a:r>
+            <a:endParaRPr lang="en-US" dirty="0"/>
+          </a:p>
+        </p:txBody>
+      </p:sp>
+      <p:pic>
+        <p:nvPicPr>
+          <p:cNvPr id="4" name="Content Placeholder 3"/>
+          <p:cNvPicPr>
+            <a:picLocks noGrp="1" noChangeAspect="1"/>
+          </p:cNvPicPr>
           <p:nvPr>
             <p:ph idx="1"/>
           </p:nvPr>
-        </p:nvSpPr>
-        <p:spPr/>
-        <p:txBody>
-          <a:bodyPr/>
-          <a:lstStyle/>
-          <a:p>
-            <a:pPr lvl="0"/>
-            <a:endParaRPr lang="en-US" dirty="0" smtClean="0"/>
-          </a:p>
-          <a:p>
-            <a:r>
-              <a:rPr lang="en-US" dirty="0" smtClean="0"/>
-              <a:t>Isolating piano sound versus human voice sound – since the human voice is within the pianos range.</a:t>
-            </a:r>
-          </a:p>
-          <a:p>
-            <a:pPr lvl="1"/>
-            <a:r>
-              <a:rPr lang="en-US" dirty="0" smtClean="0"/>
-              <a:t>Used </a:t>
-            </a:r>
-            <a:r>
-              <a:rPr lang="en-US" dirty="0" err="1" smtClean="0"/>
-              <a:t>pulseIn</a:t>
-            </a:r>
-            <a:r>
-              <a:rPr lang="en-US" dirty="0" smtClean="0"/>
-              <a:t> duration as well – difficult to calculate the actual practice time based on </a:t>
-            </a:r>
-            <a:r>
-              <a:rPr lang="en-US" dirty="0" err="1" smtClean="0"/>
-              <a:t>pulseIn</a:t>
-            </a:r>
-            <a:r>
-              <a:rPr lang="en-US" dirty="0" smtClean="0"/>
-              <a:t> duration</a:t>
-            </a:r>
-          </a:p>
-          <a:p>
-            <a:pPr lvl="1"/>
-            <a:r>
-              <a:rPr lang="en-US" dirty="0" smtClean="0"/>
-              <a:t>Have to interpolate between when the message is posted and the total </a:t>
-            </a:r>
-            <a:r>
-              <a:rPr lang="en-US" dirty="0" err="1" smtClean="0"/>
-              <a:t>pulseIn</a:t>
-            </a:r>
-            <a:r>
-              <a:rPr lang="en-US" dirty="0" smtClean="0"/>
-              <a:t> duration logged</a:t>
-            </a:r>
-          </a:p>
-          <a:p>
-            <a:r>
-              <a:rPr lang="en-US" dirty="0" smtClean="0"/>
-              <a:t>Can’t tell if somebody can game the device</a:t>
-            </a:r>
-          </a:p>
-          <a:p>
-            <a:pPr marL="0" indent="0">
-              <a:buNone/>
-            </a:pPr>
-            <a:endParaRPr lang="en-US" dirty="0"/>
-          </a:p>
-        </p:txBody>
-      </p:sp>
+        </p:nvPicPr>
+        <p:blipFill>
+          <a:blip r:embed="rId2">
+            <a:extLst>
+              <a:ext uri="{28A0092B-C50C-407E-A947-70E740481C1C}">
+                <a14:useLocalDpi xmlns:a14="http://schemas.microsoft.com/office/drawing/2010/main" val="0"/>
+              </a:ext>
+            </a:extLst>
+          </a:blip>
+          <a:stretch>
+            <a:fillRect/>
+          </a:stretch>
+        </p:blipFill>
+        <p:spPr>
+          <a:xfrm>
+            <a:off x="2113471" y="1616006"/>
+            <a:ext cx="6219646" cy="5086719"/>
+          </a:xfrm>
+        </p:spPr>
+      </p:pic>
     </p:spTree>
     <p:extLst>
       <p:ext uri="{BB962C8B-B14F-4D97-AF65-F5344CB8AC3E}">
-        <p14:creationId xmlns:p14="http://schemas.microsoft.com/office/powerpoint/2010/main" val="3375739523"/>
+        <p14:creationId xmlns:p14="http://schemas.microsoft.com/office/powerpoint/2010/main" val="2623860443"/>
       </p:ext>
     </p:extLst>
   </p:cSld>
@@ -6403,6 +6357,146 @@
           <a:p>
             <a:r>
               <a:rPr lang="en-US" dirty="0" smtClean="0"/>
+              <a:t>Technical Difficulties</a:t>
+            </a:r>
+            <a:endParaRPr lang="en-US" dirty="0"/>
+          </a:p>
+        </p:txBody>
+      </p:sp>
+      <p:sp>
+        <p:nvSpPr>
+          <p:cNvPr id="3" name="Content Placeholder 2"/>
+          <p:cNvSpPr>
+            <a:spLocks noGrp="1"/>
+          </p:cNvSpPr>
+          <p:nvPr>
+            <p:ph idx="1"/>
+          </p:nvPr>
+        </p:nvSpPr>
+        <p:spPr/>
+        <p:txBody>
+          <a:bodyPr/>
+          <a:lstStyle/>
+          <a:p>
+            <a:pPr lvl="0"/>
+            <a:endParaRPr lang="en-US" dirty="0" smtClean="0"/>
+          </a:p>
+          <a:p>
+            <a:r>
+              <a:rPr lang="en-US" dirty="0" smtClean="0"/>
+              <a:t>Isolating piano sound versus human voice sound – since the human voice is within the pianos range.</a:t>
+            </a:r>
+          </a:p>
+          <a:p>
+            <a:pPr lvl="1"/>
+            <a:r>
+              <a:rPr lang="en-US" dirty="0" smtClean="0"/>
+              <a:t>Used </a:t>
+            </a:r>
+            <a:r>
+              <a:rPr lang="en-US" dirty="0" err="1" smtClean="0"/>
+              <a:t>pulseIn</a:t>
+            </a:r>
+            <a:r>
+              <a:rPr lang="en-US" dirty="0" smtClean="0"/>
+              <a:t> duration as well – difficult to calculate the actual practice time based on </a:t>
+            </a:r>
+            <a:r>
+              <a:rPr lang="en-US" dirty="0" err="1" smtClean="0"/>
+              <a:t>pulseIn</a:t>
+            </a:r>
+            <a:r>
+              <a:rPr lang="en-US" dirty="0" smtClean="0"/>
+              <a:t> duration</a:t>
+            </a:r>
+          </a:p>
+          <a:p>
+            <a:pPr lvl="1"/>
+            <a:r>
+              <a:rPr lang="en-US" dirty="0" smtClean="0"/>
+              <a:t>Have to interpolate between when the message is posted and the total </a:t>
+            </a:r>
+            <a:r>
+              <a:rPr lang="en-US" dirty="0" err="1" smtClean="0"/>
+              <a:t>pulseIn</a:t>
+            </a:r>
+            <a:r>
+              <a:rPr lang="en-US" dirty="0" smtClean="0"/>
+              <a:t> duration logged</a:t>
+            </a:r>
+          </a:p>
+          <a:p>
+            <a:r>
+              <a:rPr lang="en-US" dirty="0" smtClean="0"/>
+              <a:t>Can’t tell if somebody can game the </a:t>
+            </a:r>
+            <a:r>
+              <a:rPr lang="en-US" dirty="0" smtClean="0"/>
+              <a:t>device</a:t>
+            </a:r>
+          </a:p>
+          <a:p>
+            <a:r>
+              <a:rPr lang="en-US" dirty="0" smtClean="0"/>
+              <a:t>QOS 2 using open source MQTT Library – need a publish release</a:t>
+            </a:r>
+            <a:endParaRPr lang="en-US" dirty="0" smtClean="0"/>
+          </a:p>
+          <a:p>
+            <a:pPr marL="0" indent="0">
+              <a:buNone/>
+            </a:pPr>
+            <a:endParaRPr lang="en-US" dirty="0"/>
+          </a:p>
+        </p:txBody>
+      </p:sp>
+    </p:spTree>
+    <p:extLst>
+      <p:ext uri="{BB962C8B-B14F-4D97-AF65-F5344CB8AC3E}">
+        <p14:creationId xmlns:p14="http://schemas.microsoft.com/office/powerpoint/2010/main" val="3375739523"/>
+      </p:ext>
+    </p:extLst>
+  </p:cSld>
+  <p:clrMapOvr>
+    <a:masterClrMapping/>
+  </p:clrMapOvr>
+</p:sld>
+</file>
+
+<file path=ppt/slides/slide7.xml><?xml version="1.0" encoding="utf-8"?>
+<p:sld xmlns:a="http://schemas.openxmlformats.org/drawingml/2006/main" xmlns:r="http://schemas.openxmlformats.org/officeDocument/2006/relationships" xmlns:p="http://schemas.openxmlformats.org/presentationml/2006/main">
+  <p:cSld>
+    <p:spTree>
+      <p:nvGrpSpPr>
+        <p:cNvPr id="1" name=""/>
+        <p:cNvGrpSpPr/>
+        <p:nvPr/>
+      </p:nvGrpSpPr>
+      <p:grpSpPr>
+        <a:xfrm>
+          <a:off x="0" y="0"/>
+          <a:ext cx="0" cy="0"/>
+          <a:chOff x="0" y="0"/>
+          <a:chExt cx="0" cy="0"/>
+        </a:xfrm>
+      </p:grpSpPr>
+      <p:sp>
+        <p:nvSpPr>
+          <p:cNvPr id="2" name="Title 1"/>
+          <p:cNvSpPr>
+            <a:spLocks noGrp="1"/>
+          </p:cNvSpPr>
+          <p:nvPr>
+            <p:ph type="title"/>
+          </p:nvPr>
+        </p:nvSpPr>
+        <p:spPr/>
+        <p:txBody>
+          <a:bodyPr/>
+          <a:lstStyle/>
+          <a:p>
+            <a:r>
+              <a:rPr lang="en-US" dirty="0" smtClean="0"/>
               <a:t>Future Plans</a:t>
             </a:r>
             <a:endParaRPr lang="en-US" dirty="0"/>
@@ -6433,6 +6527,13 @@
             <a:r>
               <a:rPr lang="en-US" dirty="0" smtClean="0"/>
               <a:t>How to compare sound log to a music piece </a:t>
+            </a:r>
+            <a:endParaRPr lang="en-US" dirty="0" smtClean="0"/>
+          </a:p>
+          <a:p>
+            <a:r>
+              <a:rPr lang="en-US" dirty="0" smtClean="0"/>
+              <a:t>Add device to electronic metronome – or add metronome functionality</a:t>
             </a:r>
             <a:endParaRPr lang="en-US" dirty="0"/>
           </a:p>
@@ -6458,7 +6559,7 @@
 </p:sld>
 </file>
 
-<file path=ppt/slides/slide7.xml><?xml version="1.0" encoding="utf-8"?>
+<file path=ppt/slides/slide8.xml><?xml version="1.0" encoding="utf-8"?>
 <p:sld xmlns:a="http://schemas.openxmlformats.org/drawingml/2006/main" xmlns:r="http://schemas.openxmlformats.org/officeDocument/2006/relationships" xmlns:p="http://schemas.openxmlformats.org/presentationml/2006/main">
   <p:cSld>
     <p:spTree>

</xml_diff>

<commit_message>
Changed the project name
</commit_message>
<xml_diff>
--- a/presentation/IOT- SEIS785.pptx
+++ b/presentation/IOT- SEIS785.pptx
@@ -349,7 +349,7 @@
             <a:fld id="{B61BEF0D-F0BB-DE4B-95CE-6DB70DBA9567}" type="datetimeFigureOut">
               <a:rPr lang="en-US" dirty="0"/>
               <a:pPr/>
-              <a:t>4/27/2016</a:t>
+              <a:t>5/11/2016</a:t>
             </a:fld>
             <a:endParaRPr lang="en-US" dirty="0"/>
           </a:p>
@@ -680,7 +680,7 @@
             <a:fld id="{B61BEF0D-F0BB-DE4B-95CE-6DB70DBA9567}" type="datetimeFigureOut">
               <a:rPr lang="en-US" dirty="0"/>
               <a:pPr/>
-              <a:t>4/27/2016</a:t>
+              <a:t>5/11/2016</a:t>
             </a:fld>
             <a:endParaRPr lang="en-US" dirty="0"/>
           </a:p>
@@ -955,7 +955,7 @@
             <a:fld id="{B61BEF0D-F0BB-DE4B-95CE-6DB70DBA9567}" type="datetimeFigureOut">
               <a:rPr lang="en-US" dirty="0"/>
               <a:pPr/>
-              <a:t>4/27/2016</a:t>
+              <a:t>5/11/2016</a:t>
             </a:fld>
             <a:endParaRPr lang="en-US" dirty="0"/>
           </a:p>
@@ -1520,7 +1520,7 @@
             <a:fld id="{B61BEF0D-F0BB-DE4B-95CE-6DB70DBA9567}" type="datetimeFigureOut">
               <a:rPr lang="en-US" dirty="0"/>
               <a:pPr/>
-              <a:t>4/27/2016</a:t>
+              <a:t>5/11/2016</a:t>
             </a:fld>
             <a:endParaRPr lang="en-US" dirty="0"/>
           </a:p>
@@ -1795,7 +1795,7 @@
             <a:fld id="{B61BEF0D-F0BB-DE4B-95CE-6DB70DBA9567}" type="datetimeFigureOut">
               <a:rPr lang="en-US" dirty="0"/>
               <a:pPr/>
-              <a:t>4/27/2016</a:t>
+              <a:t>5/11/2016</a:t>
             </a:fld>
             <a:endParaRPr lang="en-US" dirty="0"/>
           </a:p>
@@ -2354,7 +2354,7 @@
             <a:fld id="{B61BEF0D-F0BB-DE4B-95CE-6DB70DBA9567}" type="datetimeFigureOut">
               <a:rPr lang="en-US" dirty="0"/>
               <a:pPr/>
-              <a:t>4/27/2016</a:t>
+              <a:t>5/11/2016</a:t>
             </a:fld>
             <a:endParaRPr lang="en-US" dirty="0"/>
           </a:p>
@@ -2678,7 +2678,7 @@
             <a:fld id="{B61BEF0D-F0BB-DE4B-95CE-6DB70DBA9567}" type="datetimeFigureOut">
               <a:rPr lang="en-US" dirty="0"/>
               <a:pPr/>
-              <a:t>4/27/2016</a:t>
+              <a:t>5/11/2016</a:t>
             </a:fld>
             <a:endParaRPr lang="en-US" dirty="0"/>
           </a:p>
@@ -2880,7 +2880,7 @@
             <a:fld id="{B61BEF0D-F0BB-DE4B-95CE-6DB70DBA9567}" type="datetimeFigureOut">
               <a:rPr lang="en-US" dirty="0"/>
               <a:pPr/>
-              <a:t>4/27/2016</a:t>
+              <a:t>5/11/2016</a:t>
             </a:fld>
             <a:endParaRPr lang="en-US" dirty="0"/>
           </a:p>
@@ -3087,7 +3087,7 @@
             <a:fld id="{B61BEF0D-F0BB-DE4B-95CE-6DB70DBA9567}" type="datetimeFigureOut">
               <a:rPr lang="en-US" dirty="0"/>
               <a:pPr/>
-              <a:t>4/27/2016</a:t>
+              <a:t>5/11/2016</a:t>
             </a:fld>
             <a:endParaRPr lang="en-US" dirty="0"/>
           </a:p>
@@ -3284,7 +3284,7 @@
             <a:fld id="{B61BEF0D-F0BB-DE4B-95CE-6DB70DBA9567}" type="datetimeFigureOut">
               <a:rPr lang="en-US" dirty="0"/>
               <a:pPr/>
-              <a:t>4/27/2016</a:t>
+              <a:t>5/11/2016</a:t>
             </a:fld>
             <a:endParaRPr lang="en-US" dirty="0"/>
           </a:p>
@@ -3557,7 +3557,7 @@
             <a:fld id="{B61BEF0D-F0BB-DE4B-95CE-6DB70DBA9567}" type="datetimeFigureOut">
               <a:rPr lang="en-US" dirty="0"/>
               <a:pPr/>
-              <a:t>4/27/2016</a:t>
+              <a:t>5/11/2016</a:t>
             </a:fld>
             <a:endParaRPr lang="en-US" dirty="0"/>
           </a:p>
@@ -3820,7 +3820,7 @@
             <a:fld id="{B61BEF0D-F0BB-DE4B-95CE-6DB70DBA9567}" type="datetimeFigureOut">
               <a:rPr lang="en-US" dirty="0"/>
               <a:pPr/>
-              <a:t>4/27/2016</a:t>
+              <a:t>5/11/2016</a:t>
             </a:fld>
             <a:endParaRPr lang="en-US" dirty="0"/>
           </a:p>
@@ -4191,7 +4191,7 @@
             <a:fld id="{B61BEF0D-F0BB-DE4B-95CE-6DB70DBA9567}" type="datetimeFigureOut">
               <a:rPr lang="en-US" dirty="0"/>
               <a:pPr/>
-              <a:t>4/27/2016</a:t>
+              <a:t>5/11/2016</a:t>
             </a:fld>
             <a:endParaRPr lang="en-US" dirty="0"/>
           </a:p>
@@ -4336,7 +4336,7 @@
             <a:fld id="{B61BEF0D-F0BB-DE4B-95CE-6DB70DBA9567}" type="datetimeFigureOut">
               <a:rPr lang="en-US" dirty="0"/>
               <a:pPr/>
-              <a:t>4/27/2016</a:t>
+              <a:t>5/11/2016</a:t>
             </a:fld>
             <a:endParaRPr lang="en-US" dirty="0"/>
           </a:p>
@@ -4458,7 +4458,7 @@
             <a:fld id="{B61BEF0D-F0BB-DE4B-95CE-6DB70DBA9567}" type="datetimeFigureOut">
               <a:rPr lang="en-US" dirty="0"/>
               <a:pPr/>
-              <a:t>4/27/2016</a:t>
+              <a:t>5/11/2016</a:t>
             </a:fld>
             <a:endParaRPr lang="en-US" dirty="0"/>
           </a:p>
@@ -4740,7 +4740,7 @@
             <a:fld id="{B61BEF0D-F0BB-DE4B-95CE-6DB70DBA9567}" type="datetimeFigureOut">
               <a:rPr lang="en-US" dirty="0"/>
               <a:pPr/>
-              <a:t>4/27/2016</a:t>
+              <a:t>5/11/2016</a:t>
             </a:fld>
             <a:endParaRPr lang="en-US" dirty="0"/>
           </a:p>
@@ -5061,7 +5061,7 @@
             <a:fld id="{B61BEF0D-F0BB-DE4B-95CE-6DB70DBA9567}" type="datetimeFigureOut">
               <a:rPr lang="en-US" dirty="0"/>
               <a:pPr/>
-              <a:t>4/27/2016</a:t>
+              <a:t>5/11/2016</a:t>
             </a:fld>
             <a:endParaRPr lang="en-US" dirty="0"/>
           </a:p>
@@ -5272,7 +5272,7 @@
             <a:fld id="{B61BEF0D-F0BB-DE4B-95CE-6DB70DBA9567}" type="datetimeFigureOut">
               <a:rPr lang="en-US" dirty="0"/>
               <a:pPr/>
-              <a:t>4/27/2016</a:t>
+              <a:t>5/11/2016</a:t>
             </a:fld>
             <a:endParaRPr lang="en-US" dirty="0"/>
           </a:p>
@@ -5798,7 +5798,11 @@
           <a:p>
             <a:r>
               <a:rPr lang="en-US" dirty="0" smtClean="0"/>
-              <a:t>SEIS-785 IOT – Music Practice</a:t>
+              <a:t>SEIS-785 IOT – Music </a:t>
+            </a:r>
+            <a:r>
+              <a:rPr lang="en-US" dirty="0" smtClean="0"/>
+              <a:t>Teacher</a:t>
             </a:r>
             <a:endParaRPr lang="en-US" dirty="0"/>
           </a:p>
@@ -5836,6 +5840,13 @@
   <p:clrMapOvr>
     <a:masterClrMapping/>
   </p:clrMapOvr>
+  <p:timing>
+    <p:tnLst>
+      <p:par>
+        <p:cTn id="1" dur="indefinite" restart="never" nodeType="tmRoot"/>
+      </p:par>
+    </p:tnLst>
+  </p:timing>
 </p:sld>
 </file>
 
@@ -5999,6 +6010,13 @@
   <p:clrMapOvr>
     <a:masterClrMapping/>
   </p:clrMapOvr>
+  <p:timing>
+    <p:tnLst>
+      <p:par>
+        <p:cTn id="1" dur="indefinite" restart="never" nodeType="tmRoot"/>
+      </p:par>
+    </p:tnLst>
+  </p:timing>
 </p:sld>
 </file>
 
@@ -6156,6 +6174,13 @@
   <p:clrMapOvr>
     <a:masterClrMapping/>
   </p:clrMapOvr>
+  <p:timing>
+    <p:tnLst>
+      <p:par>
+        <p:cTn id="1" dur="indefinite" restart="never" nodeType="tmRoot"/>
+      </p:par>
+    </p:tnLst>
+  </p:timing>
 </p:sld>
 </file>
 
@@ -6238,6 +6263,13 @@
   <p:clrMapOvr>
     <a:masterClrMapping/>
   </p:clrMapOvr>
+  <p:timing>
+    <p:tnLst>
+      <p:par>
+        <p:cTn id="1" dur="indefinite" restart="never" nodeType="tmRoot"/>
+      </p:par>
+    </p:tnLst>
+  </p:timing>
 </p:sld>
 </file>
 
@@ -6320,6 +6352,13 @@
   <p:clrMapOvr>
     <a:masterClrMapping/>
   </p:clrMapOvr>
+  <p:timing>
+    <p:tnLst>
+      <p:par>
+        <p:cTn id="1" dur="indefinite" restart="never" nodeType="tmRoot"/>
+      </p:par>
+    </p:tnLst>
+  </p:timing>
 </p:sld>
 </file>
 
@@ -6428,11 +6467,7 @@
           <a:p>
             <a:r>
               <a:rPr lang="en-US" dirty="0" smtClean="0"/>
-              <a:t>Can’t tell if somebody can game the </a:t>
-            </a:r>
-            <a:r>
-              <a:rPr lang="en-US" dirty="0" smtClean="0"/>
-              <a:t>device</a:t>
+              <a:t>Can’t tell if somebody can game the device</a:t>
             </a:r>
           </a:p>
           <a:p>
@@ -6440,7 +6475,6 @@
               <a:rPr lang="en-US" dirty="0" smtClean="0"/>
               <a:t>QOS 2 using open source MQTT Library – need a publish release</a:t>
             </a:r>
-            <a:endParaRPr lang="en-US" dirty="0" smtClean="0"/>
           </a:p>
           <a:p>
             <a:pPr marL="0" indent="0">
@@ -6460,6 +6494,13 @@
   <p:clrMapOvr>
     <a:masterClrMapping/>
   </p:clrMapOvr>
+  <p:timing>
+    <p:tnLst>
+      <p:par>
+        <p:cTn id="1" dur="indefinite" restart="never" nodeType="tmRoot"/>
+      </p:par>
+    </p:tnLst>
+  </p:timing>
 </p:sld>
 </file>
 
@@ -6528,7 +6569,6 @@
               <a:rPr lang="en-US" dirty="0" smtClean="0"/>
               <a:t>How to compare sound log to a music piece </a:t>
             </a:r>
-            <a:endParaRPr lang="en-US" dirty="0" smtClean="0"/>
           </a:p>
           <a:p>
             <a:r>

</xml_diff>